<commit_message>
prepping source for presentation - minus deployment
</commit_message>
<xml_diff>
--- a/dotNet/dropkick/DropkicK.pptx
+++ b/dotNet/dropkick/DropkicK.pptx
@@ -5,7 +5,7 @@
     <p:sldMasterId id="2147483756" r:id="rId1"/>
   </p:sldMasterIdLst>
   <p:notesMasterIdLst>
-    <p:notesMasterId r:id="rId31"/>
+    <p:notesMasterId r:id="rId32"/>
   </p:notesMasterIdLst>
   <p:sldIdLst>
     <p:sldId id="256" r:id="rId2"/>
@@ -29,14 +29,15 @@
     <p:sldId id="338" r:id="rId20"/>
     <p:sldId id="342" r:id="rId21"/>
     <p:sldId id="340" r:id="rId22"/>
-    <p:sldId id="341" r:id="rId23"/>
-    <p:sldId id="343" r:id="rId24"/>
-    <p:sldId id="344" r:id="rId25"/>
-    <p:sldId id="345" r:id="rId26"/>
+    <p:sldId id="345" r:id="rId23"/>
+    <p:sldId id="341" r:id="rId24"/>
+    <p:sldId id="343" r:id="rId25"/>
+    <p:sldId id="344" r:id="rId26"/>
     <p:sldId id="347" r:id="rId27"/>
     <p:sldId id="348" r:id="rId28"/>
     <p:sldId id="349" r:id="rId29"/>
     <p:sldId id="324" r:id="rId30"/>
+    <p:sldId id="350" r:id="rId31"/>
   </p:sldIdLst>
   <p:sldSz cx="9144000" cy="6858000" type="screen4x3"/>
   <p:notesSz cx="6858000" cy="9144000"/>
@@ -4686,6 +4687,13 @@
   <p:clrMapOvr>
     <a:masterClrMapping/>
   </p:clrMapOvr>
+  <p:timing>
+    <p:tnLst>
+      <p:par>
+        <p:cTn id="1" dur="indefinite" restart="never" nodeType="tmRoot"/>
+      </p:par>
+    </p:tnLst>
+  </p:timing>
 </p:sld>
 </file>
 
@@ -4769,6 +4777,13 @@
   <p:clrMapOvr>
     <a:masterClrMapping/>
   </p:clrMapOvr>
+  <p:timing>
+    <p:tnLst>
+      <p:par>
+        <p:cTn id="1" dur="indefinite" restart="never" nodeType="tmRoot"/>
+      </p:par>
+    </p:tnLst>
+  </p:timing>
 </p:sld>
 </file>
 
@@ -4930,6 +4945,13 @@
   <p:clrMapOvr>
     <a:masterClrMapping/>
   </p:clrMapOvr>
+  <p:timing>
+    <p:tnLst>
+      <p:par>
+        <p:cTn id="1" dur="indefinite" restart="never" nodeType="tmRoot"/>
+      </p:par>
+    </p:tnLst>
+  </p:timing>
 </p:sld>
 </file>
 
@@ -5029,6 +5051,13 @@
   <p:clrMapOvr>
     <a:masterClrMapping/>
   </p:clrMapOvr>
+  <p:timing>
+    <p:tnLst>
+      <p:par>
+        <p:cTn id="1" dur="indefinite" restart="never" nodeType="tmRoot"/>
+      </p:par>
+    </p:tnLst>
+  </p:timing>
 </p:sld>
 </file>
 
@@ -5278,6 +5307,13 @@
   <p:clrMapOvr>
     <a:masterClrMapping/>
   </p:clrMapOvr>
+  <p:timing>
+    <p:tnLst>
+      <p:par>
+        <p:cTn id="1" dur="indefinite" restart="never" nodeType="tmRoot"/>
+      </p:par>
+    </p:tnLst>
+  </p:timing>
 </p:sld>
 </file>
 
@@ -5398,6 +5434,13 @@
   <p:clrMapOvr>
     <a:masterClrMapping/>
   </p:clrMapOvr>
+  <p:timing>
+    <p:tnLst>
+      <p:par>
+        <p:cTn id="1" dur="indefinite" restart="never" nodeType="tmRoot"/>
+      </p:par>
+    </p:tnLst>
+  </p:timing>
 </p:sld>
 </file>
 
@@ -5435,7 +5478,7 @@
           <a:p>
             <a:r>
               <a:rPr lang="en-US" dirty="0" smtClean="0"/>
-              <a:t>Deployment Step / Task</a:t>
+              <a:t>Deployment Server Maps</a:t>
             </a:r>
             <a:endParaRPr lang="en-US" dirty="0"/>
           </a:p>
@@ -5456,15 +5499,80 @@
           <a:bodyPr/>
           <a:lstStyle/>
           <a:p>
-            <a:endParaRPr lang="en-US"/>
-          </a:p>
-        </p:txBody>
-      </p:sp>
+            <a:r>
+              <a:rPr lang="en-US" dirty="0" smtClean="0"/>
+              <a:t>Mapping your deployment roles to one or more physical </a:t>
+            </a:r>
+            <a:r>
+              <a:rPr lang="en-US" dirty="0" smtClean="0"/>
+              <a:t>locations</a:t>
+            </a:r>
+          </a:p>
+          <a:p>
+            <a:r>
+              <a:rPr lang="en-US" i="1" dirty="0" err="1" smtClean="0"/>
+              <a:t>e</a:t>
+            </a:r>
+            <a:r>
+              <a:rPr lang="en-US" i="1" dirty="0" err="1" smtClean="0"/>
+              <a:t>nvironment</a:t>
+            </a:r>
+            <a:r>
+              <a:rPr lang="en-US" dirty="0" err="1" smtClean="0"/>
+              <a:t>.servermaps</a:t>
+            </a:r>
+            <a:r>
+              <a:rPr lang="en-US" dirty="0" smtClean="0"/>
+              <a:t> - JSON property file</a:t>
+            </a:r>
+            <a:endParaRPr lang="en-US" dirty="0"/>
+          </a:p>
+        </p:txBody>
+      </p:sp>
+      <p:pic>
+        <p:nvPicPr>
+          <p:cNvPr id="2050" name="Picture 2"/>
+          <p:cNvPicPr>
+            <a:picLocks noChangeAspect="1" noChangeArrowheads="1"/>
+          </p:cNvPicPr>
+          <p:nvPr/>
+        </p:nvPicPr>
+        <p:blipFill>
+          <a:blip r:embed="rId2" cstate="print"/>
+          <a:srcRect/>
+          <a:stretch>
+            <a:fillRect/>
+          </a:stretch>
+        </p:blipFill>
+        <p:spPr bwMode="auto">
+          <a:xfrm>
+            <a:off x="2124075" y="3657600"/>
+            <a:ext cx="4895850" cy="2171700"/>
+          </a:xfrm>
+          <a:prstGeom prst="rect">
+            <a:avLst/>
+          </a:prstGeom>
+          <a:noFill/>
+          <a:ln w="9525">
+            <a:noFill/>
+            <a:miter lim="800000"/>
+            <a:headEnd/>
+            <a:tailEnd/>
+          </a:ln>
+        </p:spPr>
+      </p:pic>
     </p:spTree>
   </p:cSld>
   <p:clrMapOvr>
     <a:masterClrMapping/>
   </p:clrMapOvr>
+  <p:timing>
+    <p:tnLst>
+      <p:par>
+        <p:cTn id="1" dur="indefinite" restart="never" nodeType="tmRoot"/>
+      </p:par>
+    </p:tnLst>
+  </p:timing>
 </p:sld>
 </file>
 
@@ -5497,14 +5605,12 @@
         </p:nvSpPr>
         <p:spPr/>
         <p:txBody>
-          <a:bodyPr>
-            <a:normAutofit fontScale="90000"/>
-          </a:bodyPr>
-          <a:lstStyle/>
-          <a:p>
-            <a:r>
-              <a:rPr lang="en-US" dirty="0" smtClean="0"/>
-              <a:t>Deployment Settings / Configuration</a:t>
+          <a:bodyPr/>
+          <a:lstStyle/>
+          <a:p>
+            <a:r>
+              <a:rPr lang="en-US" dirty="0" smtClean="0"/>
+              <a:t>Deployment Step / Task</a:t>
             </a:r>
             <a:endParaRPr lang="en-US" dirty="0"/>
           </a:p>
@@ -5525,15 +5631,58 @@
           <a:bodyPr/>
           <a:lstStyle/>
           <a:p>
-            <a:endParaRPr lang="en-US"/>
-          </a:p>
-        </p:txBody>
-      </p:sp>
+            <a:r>
+              <a:rPr lang="en-US" dirty="0" smtClean="0"/>
+              <a:t>Lots of steps in this task</a:t>
+            </a:r>
+            <a:endParaRPr lang="en-US" dirty="0"/>
+          </a:p>
+        </p:txBody>
+      </p:sp>
+      <p:pic>
+        <p:nvPicPr>
+          <p:cNvPr id="1028" name="Picture 4"/>
+          <p:cNvPicPr>
+            <a:picLocks noChangeAspect="1" noChangeArrowheads="1"/>
+          </p:cNvPicPr>
+          <p:nvPr/>
+        </p:nvPicPr>
+        <p:blipFill>
+          <a:blip r:embed="rId2" cstate="print"/>
+          <a:srcRect/>
+          <a:stretch>
+            <a:fillRect/>
+          </a:stretch>
+        </p:blipFill>
+        <p:spPr bwMode="auto">
+          <a:xfrm>
+            <a:off x="166878" y="2290762"/>
+            <a:ext cx="8810245" cy="4491038"/>
+          </a:xfrm>
+          <a:prstGeom prst="rect">
+            <a:avLst/>
+          </a:prstGeom>
+          <a:noFill/>
+          <a:ln w="9525">
+            <a:noFill/>
+            <a:miter lim="800000"/>
+            <a:headEnd/>
+            <a:tailEnd/>
+          </a:ln>
+        </p:spPr>
+      </p:pic>
     </p:spTree>
   </p:cSld>
   <p:clrMapOvr>
     <a:masterClrMapping/>
   </p:clrMapOvr>
+  <p:timing>
+    <p:tnLst>
+      <p:par>
+        <p:cTn id="1" dur="indefinite" restart="never" nodeType="tmRoot"/>
+      </p:par>
+    </p:tnLst>
+  </p:timing>
 </p:sld>
 </file>
 
@@ -5566,12 +5715,14 @@
         </p:nvSpPr>
         <p:spPr/>
         <p:txBody>
-          <a:bodyPr/>
-          <a:lstStyle/>
-          <a:p>
-            <a:r>
-              <a:rPr lang="en-US" dirty="0" smtClean="0"/>
-              <a:t>Deployment Server</a:t>
+          <a:bodyPr>
+            <a:normAutofit fontScale="90000"/>
+          </a:bodyPr>
+          <a:lstStyle/>
+          <a:p>
+            <a:r>
+              <a:rPr lang="en-US" dirty="0" smtClean="0"/>
+              <a:t>Deployment Settings / Configuration</a:t>
             </a:r>
             <a:endParaRPr lang="en-US" dirty="0"/>
           </a:p>
@@ -5592,15 +5743,96 @@
           <a:bodyPr/>
           <a:lstStyle/>
           <a:p>
-            <a:endParaRPr lang="en-US"/>
-          </a:p>
-        </p:txBody>
-      </p:sp>
+            <a:r>
+              <a:rPr lang="en-US" dirty="0" smtClean="0"/>
+              <a:t>C# matches</a:t>
+            </a:r>
+          </a:p>
+          <a:p>
+            <a:r>
+              <a:rPr lang="en-US" dirty="0" smtClean="0"/>
+              <a:t>JSON property file</a:t>
+            </a:r>
+            <a:endParaRPr lang="en-US" dirty="0"/>
+          </a:p>
+        </p:txBody>
+      </p:sp>
+      <p:pic>
+        <p:nvPicPr>
+          <p:cNvPr id="4098" name="Picture 2"/>
+          <p:cNvPicPr>
+            <a:picLocks noChangeAspect="1" noChangeArrowheads="1"/>
+          </p:cNvPicPr>
+          <p:nvPr/>
+        </p:nvPicPr>
+        <p:blipFill>
+          <a:blip r:embed="rId2" cstate="print"/>
+          <a:srcRect/>
+          <a:stretch>
+            <a:fillRect/>
+          </a:stretch>
+        </p:blipFill>
+        <p:spPr bwMode="auto">
+          <a:xfrm>
+            <a:off x="4057650" y="1676400"/>
+            <a:ext cx="5086350" cy="2571750"/>
+          </a:xfrm>
+          <a:prstGeom prst="rect">
+            <a:avLst/>
+          </a:prstGeom>
+          <a:noFill/>
+          <a:ln w="9525">
+            <a:noFill/>
+            <a:miter lim="800000"/>
+            <a:headEnd/>
+            <a:tailEnd/>
+          </a:ln>
+        </p:spPr>
+      </p:pic>
+      <p:pic>
+        <p:nvPicPr>
+          <p:cNvPr id="4099" name="Picture 3"/>
+          <p:cNvPicPr>
+            <a:picLocks noChangeAspect="1" noChangeArrowheads="1"/>
+          </p:cNvPicPr>
+          <p:nvPr/>
+        </p:nvPicPr>
+        <p:blipFill>
+          <a:blip r:embed="rId3" cstate="print"/>
+          <a:srcRect/>
+          <a:stretch>
+            <a:fillRect/>
+          </a:stretch>
+        </p:blipFill>
+        <p:spPr bwMode="auto">
+          <a:xfrm>
+            <a:off x="457200" y="4419600"/>
+            <a:ext cx="5486400" cy="1895475"/>
+          </a:xfrm>
+          <a:prstGeom prst="rect">
+            <a:avLst/>
+          </a:prstGeom>
+          <a:noFill/>
+          <a:ln w="9525">
+            <a:noFill/>
+            <a:miter lim="800000"/>
+            <a:headEnd/>
+            <a:tailEnd/>
+          </a:ln>
+        </p:spPr>
+      </p:pic>
     </p:spTree>
   </p:cSld>
   <p:clrMapOvr>
     <a:masterClrMapping/>
   </p:clrMapOvr>
+  <p:timing>
+    <p:tnLst>
+      <p:par>
+        <p:cTn id="1" dur="indefinite" restart="never" nodeType="tmRoot"/>
+      </p:par>
+    </p:tnLst>
+  </p:timing>
 </p:sld>
 </file>
 
@@ -5638,7 +5870,7 @@
           <a:p>
             <a:r>
               <a:rPr lang="en-US" dirty="0" smtClean="0"/>
-              <a:t>Deployment Server Maps</a:t>
+              <a:t>Deployment Server</a:t>
             </a:r>
             <a:endParaRPr lang="en-US" dirty="0"/>
           </a:p>
@@ -5661,7 +5893,21 @@
           <a:p>
             <a:r>
               <a:rPr lang="en-US" dirty="0" smtClean="0"/>
-              <a:t>Mapping your deployment roles to one or more physical locations</a:t>
+              <a:t>Server(s) you are deploying to – during configuration it’s declarative / proto server</a:t>
+            </a:r>
+          </a:p>
+          <a:p>
+            <a:r>
+              <a:rPr lang="en-US" dirty="0" smtClean="0"/>
+              <a:t>During runtime, resolves physical servers tied to roles in *.</a:t>
+            </a:r>
+            <a:r>
+              <a:rPr lang="en-US" dirty="0" err="1" smtClean="0"/>
+              <a:t>servermaps</a:t>
+            </a:r>
+            <a:r>
+              <a:rPr lang="en-US" dirty="0" smtClean="0"/>
+              <a:t> file</a:t>
             </a:r>
             <a:endParaRPr lang="en-US" dirty="0"/>
           </a:p>
@@ -5672,6 +5918,13 @@
   <p:clrMapOvr>
     <a:masterClrMapping/>
   </p:clrMapOvr>
+  <p:timing>
+    <p:tnLst>
+      <p:par>
+        <p:cTn id="1" dur="indefinite" restart="never" nodeType="tmRoot"/>
+      </p:par>
+    </p:tnLst>
+  </p:timing>
 </p:sld>
 </file>
 
@@ -5772,6 +6025,13 @@
   <p:clrMapOvr>
     <a:masterClrMapping/>
   </p:clrMapOvr>
+  <p:timing>
+    <p:tnLst>
+      <p:par>
+        <p:cTn id="1" dur="indefinite" restart="never" nodeType="tmRoot"/>
+      </p:par>
+    </p:tnLst>
+  </p:timing>
 </p:sld>
 </file>
 
@@ -5831,18 +6091,91 @@
           <a:lstStyle/>
           <a:p>
             <a:r>
-              <a:rPr lang="en-US" smtClean="0"/>
-              <a:t>Several Logs</a:t>
+              <a:rPr lang="en-US" dirty="0" smtClean="0"/>
+              <a:t>Several </a:t>
+            </a:r>
+            <a:r>
+              <a:rPr lang="en-US" dirty="0" smtClean="0"/>
+              <a:t>Logs</a:t>
+            </a:r>
+          </a:p>
+          <a:p>
+            <a:r>
+              <a:rPr lang="en-US" dirty="0" smtClean="0"/>
+              <a:t>Run log</a:t>
+            </a:r>
+          </a:p>
+          <a:p>
+            <a:r>
+              <a:rPr lang="en-US" dirty="0" smtClean="0"/>
+              <a:t>Dropkick Deployment</a:t>
+            </a:r>
+          </a:p>
+          <a:p>
+            <a:r>
+              <a:rPr lang="en-US" dirty="0" smtClean="0"/>
+              <a:t>File Change</a:t>
+            </a:r>
+          </a:p>
+          <a:p>
+            <a:r>
+              <a:rPr lang="en-US" dirty="0" smtClean="0"/>
+              <a:t>Security Change</a:t>
+            </a:r>
+          </a:p>
+          <a:p>
+            <a:r>
+              <a:rPr lang="en-US" dirty="0" smtClean="0"/>
+              <a:t>Database Change</a:t>
             </a:r>
             <a:endParaRPr lang="en-US" dirty="0"/>
           </a:p>
         </p:txBody>
       </p:sp>
+      <p:pic>
+        <p:nvPicPr>
+          <p:cNvPr id="3074" name="Picture 2"/>
+          <p:cNvPicPr>
+            <a:picLocks noChangeAspect="1" noChangeArrowheads="1"/>
+          </p:cNvPicPr>
+          <p:nvPr/>
+        </p:nvPicPr>
+        <p:blipFill>
+          <a:blip r:embed="rId2" cstate="print"/>
+          <a:srcRect r="53845"/>
+          <a:stretch>
+            <a:fillRect/>
+          </a:stretch>
+        </p:blipFill>
+        <p:spPr bwMode="auto">
+          <a:xfrm>
+            <a:off x="4533214" y="1828800"/>
+            <a:ext cx="4610786" cy="2895600"/>
+          </a:xfrm>
+          <a:prstGeom prst="rect">
+            <a:avLst/>
+          </a:prstGeom>
+          <a:noFill/>
+          <a:ln w="9525">
+            <a:noFill/>
+            <a:miter lim="800000"/>
+            <a:headEnd/>
+            <a:tailEnd/>
+          </a:ln>
+        </p:spPr>
+      </p:pic>
     </p:spTree>
   </p:cSld>
   <p:clrMapOvr>
     <a:masterClrMapping/>
   </p:clrMapOvr>
+  <p:timing>
+    <p:tnLst>
+      <p:par>
+        <p:cTn id="1" dur="indefinite" restart="never" nodeType="tmRoot"/>
+      </p:par>
+    </p:tnLst>
+  </p:timing>
 </p:sld>
 </file>
 
@@ -5901,7 +6234,29 @@
           <a:bodyPr/>
           <a:lstStyle/>
           <a:p>
-            <a:endParaRPr lang="en-US"/>
+            <a:r>
+              <a:rPr lang="en-US" dirty="0" smtClean="0"/>
+              <a:t>First class citizens</a:t>
+            </a:r>
+          </a:p>
+          <a:p>
+            <a:r>
+              <a:rPr lang="en-US" dirty="0" smtClean="0"/>
+              <a:t>Required by dropkick</a:t>
+            </a:r>
+          </a:p>
+          <a:p>
+            <a:r>
+              <a:rPr lang="en-US" dirty="0" smtClean="0"/>
+              <a:t>Must be known prior to deploy</a:t>
+            </a:r>
+          </a:p>
+          <a:p>
+            <a:r>
+              <a:rPr lang="en-US" dirty="0" smtClean="0"/>
+              <a:t>Could be written on the fly depending on how dynamic the settings.js file is</a:t>
+            </a:r>
+            <a:endParaRPr lang="en-US" dirty="0"/>
           </a:p>
         </p:txBody>
       </p:sp>
@@ -5910,6 +6265,13 @@
   <p:clrMapOvr>
     <a:masterClrMapping/>
   </p:clrMapOvr>
+  <p:timing>
+    <p:tnLst>
+      <p:par>
+        <p:cTn id="1" dur="indefinite" restart="never" nodeType="tmRoot"/>
+      </p:par>
+    </p:tnLst>
+  </p:timing>
 </p:sld>
 </file>
 
@@ -6064,6 +6426,113 @@
       </p:par>
     </p:tnLst>
   </p:timing>
+</p:sld>
+</file>
+
+<file path=ppt/slides/slide30.xml><?xml version="1.0" encoding="utf-8"?>
+<p:sld xmlns:a="http://schemas.openxmlformats.org/drawingml/2006/main" xmlns:r="http://schemas.openxmlformats.org/officeDocument/2006/relationships" xmlns:p="http://schemas.openxmlformats.org/presentationml/2006/main">
+  <p:cSld>
+    <p:spTree>
+      <p:nvGrpSpPr>
+        <p:cNvPr id="1" name=""/>
+        <p:cNvGrpSpPr/>
+        <p:nvPr/>
+      </p:nvGrpSpPr>
+      <p:grpSpPr>
+        <a:xfrm>
+          <a:off x="0" y="0"/>
+          <a:ext cx="0" cy="0"/>
+          <a:chOff x="0" y="0"/>
+          <a:chExt cx="0" cy="0"/>
+        </a:xfrm>
+      </p:grpSpPr>
+      <p:sp>
+        <p:nvSpPr>
+          <p:cNvPr id="2" name="Title 1"/>
+          <p:cNvSpPr>
+            <a:spLocks noGrp="1"/>
+          </p:cNvSpPr>
+          <p:nvPr>
+            <p:ph type="title"/>
+          </p:nvPr>
+        </p:nvSpPr>
+        <p:spPr/>
+        <p:txBody>
+          <a:bodyPr/>
+          <a:lstStyle/>
+          <a:p>
+            <a:r>
+              <a:rPr lang="en-US" dirty="0" smtClean="0"/>
+              <a:t>Questions?</a:t>
+            </a:r>
+            <a:endParaRPr lang="en-US" dirty="0"/>
+          </a:p>
+        </p:txBody>
+      </p:sp>
+      <p:sp>
+        <p:nvSpPr>
+          <p:cNvPr id="3" name="Content Placeholder 2"/>
+          <p:cNvSpPr>
+            <a:spLocks noGrp="1"/>
+          </p:cNvSpPr>
+          <p:nvPr>
+            <p:ph idx="1"/>
+          </p:nvPr>
+        </p:nvSpPr>
+        <p:spPr/>
+        <p:txBody>
+          <a:bodyPr/>
+          <a:lstStyle/>
+          <a:p>
+            <a:r>
+              <a:rPr lang="en-US" dirty="0" err="1" smtClean="0"/>
+              <a:t>DropkicK</a:t>
+            </a:r>
+            <a:endParaRPr lang="en-US" dirty="0" smtClean="0"/>
+          </a:p>
+          <a:p>
+            <a:r>
+              <a:rPr lang="en-US" dirty="0" err="1" smtClean="0"/>
+              <a:t>ChuckNorris</a:t>
+            </a:r>
+            <a:r>
+              <a:rPr lang="en-US" dirty="0" smtClean="0"/>
+              <a:t> Framework (CNF)</a:t>
+            </a:r>
+          </a:p>
+          <a:p>
+            <a:endParaRPr lang="en-US" dirty="0" smtClean="0"/>
+          </a:p>
+          <a:p>
+            <a:r>
+              <a:rPr lang="en-US" dirty="0" smtClean="0"/>
+              <a:t>ferventcoder (</a:t>
+            </a:r>
+            <a:r>
+              <a:rPr lang="en-US" dirty="0" err="1" smtClean="0"/>
+              <a:t>gmail</a:t>
+            </a:r>
+            <a:r>
+              <a:rPr lang="en-US" dirty="0" smtClean="0"/>
+              <a:t>/twitter/</a:t>
+            </a:r>
+            <a:r>
+              <a:rPr lang="en-US" dirty="0" err="1" smtClean="0"/>
+              <a:t>github</a:t>
+            </a:r>
+            <a:r>
+              <a:rPr lang="en-US" dirty="0" smtClean="0"/>
+              <a:t>)</a:t>
+            </a:r>
+            <a:endParaRPr lang="en-US" dirty="0"/>
+          </a:p>
+        </p:txBody>
+      </p:sp>
+    </p:spTree>
+  </p:cSld>
+  <p:clrMapOvr>
+    <a:masterClrMapping/>
+  </p:clrMapOvr>
 </p:sld>
 </file>
 

</xml_diff>

<commit_message>
Finishing up pre presentation notes and lab instructions
</commit_message>
<xml_diff>
--- a/dotNet/dropkick/DropkicK.pptx
+++ b/dotNet/dropkick/DropkicK.pptx
@@ -222,7 +222,7 @@
             <a:fld id="{F8705BBE-BC03-42F3-A30B-8ED0F940BFAD}" type="datetimeFigureOut">
               <a:rPr lang="en-US" smtClean="0"/>
               <a:pPr/>
-              <a:t>3/20/2012</a:t>
+              <a:t>3/21/2012</a:t>
             </a:fld>
             <a:endParaRPr lang="en-US"/>
           </a:p>
@@ -838,7 +838,7 @@
             <a:fld id="{C3CE9471-DEB6-4DE0-B19C-141FBC909CBF}" type="datetimeFigureOut">
               <a:rPr lang="en-US" smtClean="0"/>
               <a:pPr/>
-              <a:t>3/20/2012</a:t>
+              <a:t>3/21/2012</a:t>
             </a:fld>
             <a:endParaRPr lang="en-US"/>
           </a:p>
@@ -1005,7 +1005,7 @@
             <a:fld id="{C3CE9471-DEB6-4DE0-B19C-141FBC909CBF}" type="datetimeFigureOut">
               <a:rPr lang="en-US" smtClean="0"/>
               <a:pPr/>
-              <a:t>3/20/2012</a:t>
+              <a:t>3/21/2012</a:t>
             </a:fld>
             <a:endParaRPr lang="en-US"/>
           </a:p>
@@ -1182,7 +1182,7 @@
             <a:fld id="{C3CE9471-DEB6-4DE0-B19C-141FBC909CBF}" type="datetimeFigureOut">
               <a:rPr lang="en-US" smtClean="0"/>
               <a:pPr/>
-              <a:t>3/20/2012</a:t>
+              <a:t>3/21/2012</a:t>
             </a:fld>
             <a:endParaRPr lang="en-US"/>
           </a:p>
@@ -1349,7 +1349,7 @@
             <a:fld id="{C3CE9471-DEB6-4DE0-B19C-141FBC909CBF}" type="datetimeFigureOut">
               <a:rPr lang="en-US" smtClean="0"/>
               <a:pPr/>
-              <a:t>3/20/2012</a:t>
+              <a:t>3/21/2012</a:t>
             </a:fld>
             <a:endParaRPr lang="en-US"/>
           </a:p>
@@ -1592,7 +1592,7 @@
             <a:fld id="{C3CE9471-DEB6-4DE0-B19C-141FBC909CBF}" type="datetimeFigureOut">
               <a:rPr lang="en-US" smtClean="0"/>
               <a:pPr/>
-              <a:t>3/20/2012</a:t>
+              <a:t>3/21/2012</a:t>
             </a:fld>
             <a:endParaRPr lang="en-US"/>
           </a:p>
@@ -1877,7 +1877,7 @@
             <a:fld id="{C3CE9471-DEB6-4DE0-B19C-141FBC909CBF}" type="datetimeFigureOut">
               <a:rPr lang="en-US" smtClean="0"/>
               <a:pPr/>
-              <a:t>3/20/2012</a:t>
+              <a:t>3/21/2012</a:t>
             </a:fld>
             <a:endParaRPr lang="en-US"/>
           </a:p>
@@ -2296,7 +2296,7 @@
             <a:fld id="{C3CE9471-DEB6-4DE0-B19C-141FBC909CBF}" type="datetimeFigureOut">
               <a:rPr lang="en-US" smtClean="0"/>
               <a:pPr/>
-              <a:t>3/20/2012</a:t>
+              <a:t>3/21/2012</a:t>
             </a:fld>
             <a:endParaRPr lang="en-US"/>
           </a:p>
@@ -2411,7 +2411,7 @@
             <a:fld id="{C3CE9471-DEB6-4DE0-B19C-141FBC909CBF}" type="datetimeFigureOut">
               <a:rPr lang="en-US" smtClean="0"/>
               <a:pPr/>
-              <a:t>3/20/2012</a:t>
+              <a:t>3/21/2012</a:t>
             </a:fld>
             <a:endParaRPr lang="en-US"/>
           </a:p>
@@ -2503,7 +2503,7 @@
             <a:fld id="{C3CE9471-DEB6-4DE0-B19C-141FBC909CBF}" type="datetimeFigureOut">
               <a:rPr lang="en-US" smtClean="0"/>
               <a:pPr/>
-              <a:t>3/20/2012</a:t>
+              <a:t>3/21/2012</a:t>
             </a:fld>
             <a:endParaRPr lang="en-US"/>
           </a:p>
@@ -2777,7 +2777,7 @@
             <a:fld id="{C3CE9471-DEB6-4DE0-B19C-141FBC909CBF}" type="datetimeFigureOut">
               <a:rPr lang="en-US" smtClean="0"/>
               <a:pPr/>
-              <a:t>3/20/2012</a:t>
+              <a:t>3/21/2012</a:t>
             </a:fld>
             <a:endParaRPr lang="en-US"/>
           </a:p>
@@ -3031,7 +3031,7 @@
             <a:fld id="{C3CE9471-DEB6-4DE0-B19C-141FBC909CBF}" type="datetimeFigureOut">
               <a:rPr lang="en-US" smtClean="0"/>
               <a:pPr/>
-              <a:t>3/20/2012</a:t>
+              <a:t>3/21/2012</a:t>
             </a:fld>
             <a:endParaRPr lang="en-US"/>
           </a:p>
@@ -3241,7 +3241,7 @@
             <a:fld id="{C3CE9471-DEB6-4DE0-B19C-141FBC909CBF}" type="datetimeFigureOut">
               <a:rPr lang="en-US" smtClean="0"/>
               <a:pPr/>
-              <a:t>3/20/2012</a:t>
+              <a:t>3/21/2012</a:t>
             </a:fld>
             <a:endParaRPr lang="en-US"/>
           </a:p>
@@ -4112,7 +4112,9 @@
         </p:nvSpPr>
         <p:spPr/>
         <p:txBody>
-          <a:bodyPr/>
+          <a:bodyPr>
+            <a:normAutofit fontScale="92500" lnSpcReduction="10000"/>
+          </a:bodyPr>
           <a:lstStyle/>
           <a:p>
             <a:r>
@@ -4138,10 +4140,18 @@
           <a:p>
             <a:r>
               <a:rPr lang="en-US" dirty="0" smtClean="0"/>
-              <a:t>Simple upgrades</a:t>
-            </a:r>
-          </a:p>
-          <a:p>
+              <a:t>Simple </a:t>
+            </a:r>
+            <a:r>
+              <a:rPr lang="en-US" dirty="0" smtClean="0"/>
+              <a:t>upgrades</a:t>
+            </a:r>
+          </a:p>
+          <a:p>
+            <a:r>
+              <a:rPr lang="en-US" dirty="0" smtClean="0"/>
+              <a:t>Independent tool – doesn’t lock you into other CNF tools to use</a:t>
+            </a:r>
             <a:endParaRPr lang="en-US" dirty="0" smtClean="0"/>
           </a:p>
           <a:p>
@@ -4158,7 +4168,52 @@
                   </a:outerShdw>
                 </a:effectLst>
               </a:rPr>
-              <a:t>DK gets 1 out of 3</a:t>
+              <a:t>DK gets </a:t>
+            </a:r>
+            <a:r>
+              <a:rPr lang="en-US" sz="4800" dirty="0" smtClean="0">
+                <a:solidFill>
+                  <a:srgbClr val="FF0000"/>
+                </a:solidFill>
+                <a:effectLst>
+                  <a:outerShdw blurRad="38100" dist="38100" dir="2700000" algn="tl">
+                    <a:srgbClr val="000000">
+                      <a:alpha val="43137"/>
+                    </a:srgbClr>
+                  </a:outerShdw>
+                </a:effectLst>
+              </a:rPr>
+              <a:t>2 </a:t>
+            </a:r>
+            <a:r>
+              <a:rPr lang="en-US" sz="4800" dirty="0" smtClean="0">
+                <a:solidFill>
+                  <a:srgbClr val="FF0000"/>
+                </a:solidFill>
+                <a:effectLst>
+                  <a:outerShdw blurRad="38100" dist="38100" dir="2700000" algn="tl">
+                    <a:srgbClr val="000000">
+                      <a:alpha val="43137"/>
+                    </a:srgbClr>
+                  </a:outerShdw>
+                </a:effectLst>
+              </a:rPr>
+              <a:t>out of </a:t>
+            </a:r>
+            <a:r>
+              <a:rPr lang="en-US" sz="4800" dirty="0" smtClean="0">
+                <a:solidFill>
+                  <a:srgbClr val="FF0000"/>
+                </a:solidFill>
+                <a:effectLst>
+                  <a:outerShdw blurRad="38100" dist="38100" dir="2700000" algn="tl">
+                    <a:srgbClr val="000000">
+                      <a:alpha val="43137"/>
+                    </a:srgbClr>
+                  </a:outerShdw>
+                </a:effectLst>
+              </a:rPr>
+              <a:t>4</a:t>
             </a:r>
             <a:endParaRPr lang="en-US" sz="4800" dirty="0">
               <a:solidFill>
@@ -4677,6 +4732,13 @@
             </a:r>
           </a:p>
           <a:p>
+            <a:pPr lvl="2"/>
+            <a:r>
+              <a:rPr lang="en-US" dirty="0" smtClean="0"/>
+              <a:t>Go from almost nothing  to completely set up</a:t>
+            </a:r>
+          </a:p>
+          <a:p>
             <a:pPr lvl="1"/>
             <a:endParaRPr lang="en-US" dirty="0"/>
           </a:p>
@@ -5501,21 +5563,13 @@
           <a:p>
             <a:r>
               <a:rPr lang="en-US" dirty="0" smtClean="0"/>
-              <a:t>Mapping your deployment roles to one or more physical </a:t>
-            </a:r>
-            <a:r>
-              <a:rPr lang="en-US" dirty="0" smtClean="0"/>
-              <a:t>locations</a:t>
+              <a:t>Mapping your deployment roles to one or more physical locations</a:t>
             </a:r>
           </a:p>
           <a:p>
             <a:r>
               <a:rPr lang="en-US" i="1" dirty="0" err="1" smtClean="0"/>
-              <a:t>e</a:t>
-            </a:r>
-            <a:r>
-              <a:rPr lang="en-US" i="1" dirty="0" err="1" smtClean="0"/>
-              <a:t>nvironment</a:t>
+              <a:t>environment</a:t>
             </a:r>
             <a:r>
               <a:rPr lang="en-US" dirty="0" err="1" smtClean="0"/>
@@ -5745,13 +5799,26 @@
           <a:p>
             <a:r>
               <a:rPr lang="en-US" dirty="0" smtClean="0"/>
-              <a:t>C# matches</a:t>
+              <a:t>C# Configuration</a:t>
             </a:r>
           </a:p>
           <a:p>
             <a:r>
               <a:rPr lang="en-US" dirty="0" smtClean="0"/>
               <a:t>JSON property file</a:t>
+            </a:r>
+          </a:p>
+          <a:p>
+            <a:r>
+              <a:rPr lang="en-US" dirty="0" smtClean="0"/>
+              <a:t>Items match in </a:t>
+            </a:r>
+            <a:br>
+              <a:rPr lang="en-US" dirty="0" smtClean="0"/>
+            </a:br>
+            <a:r>
+              <a:rPr lang="en-US" dirty="0" smtClean="0"/>
+              <a:t>casing &amp; all</a:t>
             </a:r>
             <a:endParaRPr lang="en-US" dirty="0"/>
           </a:p>
@@ -6002,7 +6069,7 @@
           <a:p>
             <a:r>
               <a:rPr lang="en-US" dirty="0" smtClean="0"/>
-              <a:t>Copy</a:t>
+              <a:t>Copy executable to a special location on the remote machine</a:t>
             </a:r>
           </a:p>
           <a:p>
@@ -6014,7 +6081,7 @@
           <a:p>
             <a:r>
               <a:rPr lang="en-US" dirty="0" smtClean="0"/>
-              <a:t>Grab output</a:t>
+              <a:t>Grab output and brings it back to running log</a:t>
             </a:r>
             <a:endParaRPr lang="en-US" dirty="0"/>
           </a:p>
@@ -6092,17 +6159,13 @@
           <a:p>
             <a:r>
               <a:rPr lang="en-US" dirty="0" smtClean="0"/>
-              <a:t>Several </a:t>
-            </a:r>
-            <a:r>
-              <a:rPr lang="en-US" dirty="0" smtClean="0"/>
-              <a:t>Logs</a:t>
-            </a:r>
-          </a:p>
-          <a:p>
-            <a:r>
-              <a:rPr lang="en-US" dirty="0" smtClean="0"/>
-              <a:t>Run log</a:t>
+              <a:t>Several Logs</a:t>
+            </a:r>
+          </a:p>
+          <a:p>
+            <a:r>
+              <a:rPr lang="en-US" dirty="0" smtClean="0"/>
+              <a:t>Run log – full per run</a:t>
             </a:r>
           </a:p>
           <a:p>
@@ -6127,6 +6190,12 @@
             <a:r>
               <a:rPr lang="en-US" dirty="0" smtClean="0"/>
               <a:t>Database Change</a:t>
+            </a:r>
+          </a:p>
+          <a:p>
+            <a:r>
+              <a:rPr lang="en-US" dirty="0" smtClean="0"/>
+              <a:t>Most are appended to</a:t>
             </a:r>
             <a:endParaRPr lang="en-US" dirty="0"/>
           </a:p>

</xml_diff>